<commit_message>
ASM-28 The_Quest  김정수 소스리뷰
</commit_message>
<xml_diff>
--- a/kim/Quest/The Quest.pptx
+++ b/kim/Quest/The Quest.pptx
@@ -32,10 +32,11 @@
     <p:sldId id="281" r:id="rId26"/>
     <p:sldId id="282" r:id="rId27"/>
     <p:sldId id="283" r:id="rId28"/>
-    <p:sldId id="285" r:id="rId29"/>
-    <p:sldId id="286" r:id="rId30"/>
-    <p:sldId id="287" r:id="rId31"/>
-    <p:sldId id="284" r:id="rId32"/>
+    <p:sldId id="288" r:id="rId29"/>
+    <p:sldId id="285" r:id="rId30"/>
+    <p:sldId id="286" r:id="rId31"/>
+    <p:sldId id="287" r:id="rId32"/>
+    <p:sldId id="284" r:id="rId33"/>
   </p:sldIdLst>
   <p:sldSz cx="9144000" cy="6858000" type="screen4x3"/>
   <p:notesSz cx="6858000" cy="9144000"/>
@@ -7266,10 +7267,141 @@
   <p:clrMapOvr>
     <a:masterClrMapping/>
   </p:clrMapOvr>
+  <p:timing>
+    <p:tnLst>
+      <p:par>
+        <p:cTn id="1" dur="indefinite" restart="never" nodeType="tmRoot"/>
+      </p:par>
+    </p:tnLst>
+  </p:timing>
 </p:sld>
 </file>
 
 <file path=ppt/slides/slide28.xml><?xml version="1.0" encoding="utf-8"?>
+<p:sld xmlns:a="http://schemas.openxmlformats.org/drawingml/2006/main" xmlns:r="http://schemas.openxmlformats.org/officeDocument/2006/relationships" xmlns:p="http://schemas.openxmlformats.org/presentationml/2006/main">
+  <p:cSld>
+    <p:spTree>
+      <p:nvGrpSpPr>
+        <p:cNvPr id="1" name=""/>
+        <p:cNvGrpSpPr/>
+        <p:nvPr/>
+      </p:nvGrpSpPr>
+      <p:grpSpPr>
+        <a:xfrm>
+          <a:off x="0" y="0"/>
+          <a:ext cx="0" cy="0"/>
+          <a:chOff x="0" y="0"/>
+          <a:chExt cx="0" cy="0"/>
+        </a:xfrm>
+      </p:grpSpPr>
+      <p:sp>
+        <p:nvSpPr>
+          <p:cNvPr id="2" name="제목 1"/>
+          <p:cNvSpPr>
+            <a:spLocks noGrp="1"/>
+          </p:cNvSpPr>
+          <p:nvPr>
+            <p:ph type="title"/>
+          </p:nvPr>
+        </p:nvSpPr>
+        <p:spPr/>
+        <p:txBody>
+          <a:bodyPr/>
+          <a:lstStyle/>
+          <a:p>
+            <a:r>
+              <a:rPr lang="ko-KR" altLang="en-US" dirty="0" smtClean="0"/>
+              <a:t>제작 후 </a:t>
+            </a:r>
+            <a:r>
+              <a:rPr lang="en-US" altLang="ko-KR" dirty="0" smtClean="0"/>
+              <a:t>UML</a:t>
+            </a:r>
+            <a:endParaRPr lang="ko-KR" altLang="en-US" dirty="0"/>
+          </a:p>
+        </p:txBody>
+      </p:sp>
+      <p:sp>
+        <p:nvSpPr>
+          <p:cNvPr id="3" name="내용 개체 틀 2"/>
+          <p:cNvSpPr>
+            <a:spLocks noGrp="1"/>
+          </p:cNvSpPr>
+          <p:nvPr>
+            <p:ph idx="1"/>
+          </p:nvPr>
+        </p:nvSpPr>
+        <p:spPr/>
+        <p:txBody>
+          <a:bodyPr/>
+          <a:lstStyle/>
+          <a:p>
+            <a:endParaRPr lang="ko-KR" altLang="en-US"/>
+          </a:p>
+        </p:txBody>
+      </p:sp>
+      <p:pic>
+        <p:nvPicPr>
+          <p:cNvPr id="1026" name="Picture 2" descr="C:\Users\김정수\Desktop\Git\kim\Quest\QuestUML제작후.png"/>
+          <p:cNvPicPr>
+            <a:picLocks noChangeAspect="1" noChangeArrowheads="1"/>
+          </p:cNvPicPr>
+          <p:nvPr/>
+        </p:nvPicPr>
+        <p:blipFill>
+          <a:blip r:embed="rId2">
+            <a:extLst>
+              <a:ext uri="{28A0092B-C50C-407E-A947-70E740481C1C}">
+                <a14:useLocalDpi xmlns:a14="http://schemas.microsoft.com/office/drawing/2010/main" val="0"/>
+              </a:ext>
+            </a:extLst>
+          </a:blip>
+          <a:srcRect/>
+          <a:stretch>
+            <a:fillRect/>
+          </a:stretch>
+        </p:blipFill>
+        <p:spPr bwMode="auto">
+          <a:xfrm>
+            <a:off x="-143074" y="0"/>
+            <a:ext cx="9467602" cy="6995021"/>
+          </a:xfrm>
+          <a:prstGeom prst="rect">
+            <a:avLst/>
+          </a:prstGeom>
+          <a:noFill/>
+          <a:extLst>
+            <a:ext uri="{909E8E84-426E-40DD-AFC4-6F175D3DCCD1}">
+              <a14:hiddenFill xmlns:a14="http://schemas.microsoft.com/office/drawing/2010/main">
+                <a:solidFill>
+                  <a:srgbClr val="FFFFFF"/>
+                </a:solidFill>
+              </a14:hiddenFill>
+            </a:ext>
+          </a:extLst>
+        </p:spPr>
+      </p:pic>
+    </p:spTree>
+    <p:extLst>
+      <p:ext uri="{BB962C8B-B14F-4D97-AF65-F5344CB8AC3E}">
+        <p14:creationId xmlns:p14="http://schemas.microsoft.com/office/powerpoint/2010/main" val="4095504566"/>
+      </p:ext>
+    </p:extLst>
+  </p:cSld>
+  <p:clrMapOvr>
+    <a:masterClrMapping/>
+  </p:clrMapOvr>
+  <p:timing>
+    <p:tnLst>
+      <p:par>
+        <p:cTn id="1" dur="indefinite" restart="never" nodeType="tmRoot"/>
+      </p:par>
+    </p:tnLst>
+  </p:timing>
+</p:sld>
+</file>
+
+<file path=ppt/slides/slide29.xml><?xml version="1.0" encoding="utf-8"?>
 <p:sld xmlns:a="http://schemas.openxmlformats.org/drawingml/2006/main" xmlns:r="http://schemas.openxmlformats.org/officeDocument/2006/relationships" xmlns:p="http://schemas.openxmlformats.org/presentationml/2006/main">
   <p:cSld>
     <p:spTree>
@@ -7379,10 +7511,161 @@
   <p:clrMapOvr>
     <a:masterClrMapping/>
   </p:clrMapOvr>
+  <p:timing>
+    <p:tnLst>
+      <p:par>
+        <p:cTn id="1" dur="indefinite" restart="never" nodeType="tmRoot"/>
+      </p:par>
+    </p:tnLst>
+  </p:timing>
 </p:sld>
 </file>
 
-<file path=ppt/slides/slide29.xml><?xml version="1.0" encoding="utf-8"?>
+<file path=ppt/slides/slide3.xml><?xml version="1.0" encoding="utf-8"?>
+<p:sld xmlns:a="http://schemas.openxmlformats.org/drawingml/2006/main" xmlns:r="http://schemas.openxmlformats.org/officeDocument/2006/relationships" xmlns:p="http://schemas.openxmlformats.org/presentationml/2006/main">
+  <p:cSld>
+    <p:spTree>
+      <p:nvGrpSpPr>
+        <p:cNvPr id="1" name=""/>
+        <p:cNvGrpSpPr/>
+        <p:nvPr/>
+      </p:nvGrpSpPr>
+      <p:grpSpPr>
+        <a:xfrm>
+          <a:off x="0" y="0"/>
+          <a:ext cx="0" cy="0"/>
+          <a:chOff x="0" y="0"/>
+          <a:chExt cx="0" cy="0"/>
+        </a:xfrm>
+      </p:grpSpPr>
+      <p:sp>
+        <p:nvSpPr>
+          <p:cNvPr id="2" name="제목 1"/>
+          <p:cNvSpPr>
+            <a:spLocks noGrp="1"/>
+          </p:cNvSpPr>
+          <p:nvPr>
+            <p:ph type="title"/>
+          </p:nvPr>
+        </p:nvSpPr>
+        <p:spPr/>
+        <p:txBody>
+          <a:bodyPr/>
+          <a:lstStyle/>
+          <a:p>
+            <a:r>
+              <a:rPr lang="en-US" altLang="ko-KR" dirty="0" smtClean="0"/>
+              <a:t>1</a:t>
+            </a:r>
+            <a:r>
+              <a:rPr lang="ko-KR" altLang="en-US" dirty="0" smtClean="0"/>
+              <a:t>일차</a:t>
+            </a:r>
+            <a:endParaRPr lang="ko-KR" altLang="en-US" dirty="0"/>
+          </a:p>
+        </p:txBody>
+      </p:sp>
+      <p:sp>
+        <p:nvSpPr>
+          <p:cNvPr id="3" name="내용 개체 틀 2"/>
+          <p:cNvSpPr>
+            <a:spLocks noGrp="1"/>
+          </p:cNvSpPr>
+          <p:nvPr>
+            <p:ph idx="1"/>
+          </p:nvPr>
+        </p:nvSpPr>
+        <p:spPr/>
+        <p:txBody>
+          <a:bodyPr/>
+          <a:lstStyle/>
+          <a:p>
+            <a:r>
+              <a:rPr lang="ko-KR" altLang="en-US" dirty="0" smtClean="0"/>
+              <a:t>기획</a:t>
+            </a:r>
+            <a:endParaRPr lang="en-US" altLang="ko-KR" dirty="0" smtClean="0"/>
+          </a:p>
+          <a:p>
+            <a:pPr lvl="1"/>
+            <a:r>
+              <a:rPr lang="en-US" altLang="ko-KR" dirty="0" err="1" smtClean="0"/>
+              <a:t>HeadFirst</a:t>
+            </a:r>
+            <a:r>
+              <a:rPr lang="en-US" altLang="ko-KR" dirty="0" smtClean="0"/>
+              <a:t> C# - The Quest</a:t>
+            </a:r>
+          </a:p>
+          <a:p>
+            <a:r>
+              <a:rPr lang="ko-KR" altLang="en-US" dirty="0" smtClean="0"/>
+              <a:t>구상</a:t>
+            </a:r>
+            <a:endParaRPr lang="en-US" altLang="ko-KR" dirty="0" smtClean="0"/>
+          </a:p>
+          <a:p>
+            <a:pPr lvl="1"/>
+            <a:r>
+              <a:rPr lang="ko-KR" altLang="en-US" dirty="0" err="1" smtClean="0"/>
+              <a:t>클래스별</a:t>
+            </a:r>
+            <a:r>
+              <a:rPr lang="ko-KR" altLang="en-US" dirty="0" smtClean="0"/>
+              <a:t> </a:t>
+            </a:r>
+            <a:r>
+              <a:rPr lang="ko-KR" altLang="en-US" dirty="0" err="1" smtClean="0"/>
+              <a:t>해야할</a:t>
+            </a:r>
+            <a:r>
+              <a:rPr lang="ko-KR" altLang="en-US" dirty="0" smtClean="0"/>
+              <a:t> 작업들</a:t>
+            </a:r>
+            <a:endParaRPr lang="en-US" altLang="ko-KR" dirty="0" smtClean="0"/>
+          </a:p>
+          <a:p>
+            <a:pPr marL="411480" lvl="1" indent="0">
+              <a:buNone/>
+            </a:pPr>
+            <a:endParaRPr lang="en-US" altLang="ko-KR" dirty="0" smtClean="0"/>
+          </a:p>
+          <a:p>
+            <a:r>
+              <a:rPr lang="ko-KR" altLang="en-US" dirty="0" smtClean="0"/>
+              <a:t>설계</a:t>
+            </a:r>
+            <a:endParaRPr lang="en-US" altLang="ko-KR" dirty="0" smtClean="0"/>
+          </a:p>
+          <a:p>
+            <a:pPr marL="0" indent="0">
+              <a:buNone/>
+            </a:pPr>
+            <a:endParaRPr lang="ko-KR" altLang="en-US" dirty="0"/>
+          </a:p>
+        </p:txBody>
+      </p:sp>
+    </p:spTree>
+    <p:extLst>
+      <p:ext uri="{BB962C8B-B14F-4D97-AF65-F5344CB8AC3E}">
+        <p14:creationId xmlns:p14="http://schemas.microsoft.com/office/powerpoint/2010/main" val="1252952109"/>
+      </p:ext>
+    </p:extLst>
+  </p:cSld>
+  <p:clrMapOvr>
+    <a:masterClrMapping/>
+  </p:clrMapOvr>
+  <p:timing>
+    <p:tnLst>
+      <p:par>
+        <p:cTn id="1" dur="indefinite" restart="never" nodeType="tmRoot"/>
+      </p:par>
+    </p:tnLst>
+  </p:timing>
+</p:sld>
+</file>
+
+<file path=ppt/slides/slide30.xml><?xml version="1.0" encoding="utf-8"?>
 <p:sld xmlns:a="http://schemas.openxmlformats.org/drawingml/2006/main" xmlns:r="http://schemas.openxmlformats.org/officeDocument/2006/relationships" xmlns:p="http://schemas.openxmlformats.org/presentationml/2006/main">
   <p:cSld>
     <p:spTree>
@@ -7492,143 +7775,6 @@
   <p:clrMapOvr>
     <a:masterClrMapping/>
   </p:clrMapOvr>
-</p:sld>
-</file>
-
-<file path=ppt/slides/slide3.xml><?xml version="1.0" encoding="utf-8"?>
-<p:sld xmlns:a="http://schemas.openxmlformats.org/drawingml/2006/main" xmlns:r="http://schemas.openxmlformats.org/officeDocument/2006/relationships" xmlns:p="http://schemas.openxmlformats.org/presentationml/2006/main">
-  <p:cSld>
-    <p:spTree>
-      <p:nvGrpSpPr>
-        <p:cNvPr id="1" name=""/>
-        <p:cNvGrpSpPr/>
-        <p:nvPr/>
-      </p:nvGrpSpPr>
-      <p:grpSpPr>
-        <a:xfrm>
-          <a:off x="0" y="0"/>
-          <a:ext cx="0" cy="0"/>
-          <a:chOff x="0" y="0"/>
-          <a:chExt cx="0" cy="0"/>
-        </a:xfrm>
-      </p:grpSpPr>
-      <p:sp>
-        <p:nvSpPr>
-          <p:cNvPr id="2" name="제목 1"/>
-          <p:cNvSpPr>
-            <a:spLocks noGrp="1"/>
-          </p:cNvSpPr>
-          <p:nvPr>
-            <p:ph type="title"/>
-          </p:nvPr>
-        </p:nvSpPr>
-        <p:spPr/>
-        <p:txBody>
-          <a:bodyPr/>
-          <a:lstStyle/>
-          <a:p>
-            <a:r>
-              <a:rPr lang="en-US" altLang="ko-KR" dirty="0" smtClean="0"/>
-              <a:t>1</a:t>
-            </a:r>
-            <a:r>
-              <a:rPr lang="ko-KR" altLang="en-US" dirty="0" smtClean="0"/>
-              <a:t>일차</a:t>
-            </a:r>
-            <a:endParaRPr lang="ko-KR" altLang="en-US" dirty="0"/>
-          </a:p>
-        </p:txBody>
-      </p:sp>
-      <p:sp>
-        <p:nvSpPr>
-          <p:cNvPr id="3" name="내용 개체 틀 2"/>
-          <p:cNvSpPr>
-            <a:spLocks noGrp="1"/>
-          </p:cNvSpPr>
-          <p:nvPr>
-            <p:ph idx="1"/>
-          </p:nvPr>
-        </p:nvSpPr>
-        <p:spPr/>
-        <p:txBody>
-          <a:bodyPr/>
-          <a:lstStyle/>
-          <a:p>
-            <a:r>
-              <a:rPr lang="ko-KR" altLang="en-US" dirty="0" smtClean="0"/>
-              <a:t>기획</a:t>
-            </a:r>
-            <a:endParaRPr lang="en-US" altLang="ko-KR" dirty="0" smtClean="0"/>
-          </a:p>
-          <a:p>
-            <a:pPr lvl="1"/>
-            <a:r>
-              <a:rPr lang="en-US" altLang="ko-KR" dirty="0" err="1" smtClean="0"/>
-              <a:t>HeadFirst</a:t>
-            </a:r>
-            <a:r>
-              <a:rPr lang="en-US" altLang="ko-KR" dirty="0" smtClean="0"/>
-              <a:t> C# - The Quest</a:t>
-            </a:r>
-          </a:p>
-          <a:p>
-            <a:r>
-              <a:rPr lang="ko-KR" altLang="en-US" dirty="0" smtClean="0"/>
-              <a:t>구상</a:t>
-            </a:r>
-            <a:endParaRPr lang="en-US" altLang="ko-KR" dirty="0" smtClean="0"/>
-          </a:p>
-          <a:p>
-            <a:pPr lvl="1"/>
-            <a:r>
-              <a:rPr lang="ko-KR" altLang="en-US" dirty="0" err="1" smtClean="0"/>
-              <a:t>클래스별</a:t>
-            </a:r>
-            <a:r>
-              <a:rPr lang="ko-KR" altLang="en-US" dirty="0" smtClean="0"/>
-              <a:t> </a:t>
-            </a:r>
-            <a:r>
-              <a:rPr lang="ko-KR" altLang="en-US" dirty="0" err="1" smtClean="0"/>
-              <a:t>해야할</a:t>
-            </a:r>
-            <a:r>
-              <a:rPr lang="ko-KR" altLang="en-US" dirty="0" smtClean="0"/>
-              <a:t> 작업들</a:t>
-            </a:r>
-            <a:endParaRPr lang="en-US" altLang="ko-KR" dirty="0" smtClean="0"/>
-          </a:p>
-          <a:p>
-            <a:pPr marL="411480" lvl="1" indent="0">
-              <a:buNone/>
-            </a:pPr>
-            <a:endParaRPr lang="en-US" altLang="ko-KR" dirty="0" smtClean="0"/>
-          </a:p>
-          <a:p>
-            <a:r>
-              <a:rPr lang="ko-KR" altLang="en-US" dirty="0" smtClean="0"/>
-              <a:t>설계</a:t>
-            </a:r>
-            <a:endParaRPr lang="en-US" altLang="ko-KR" dirty="0" smtClean="0"/>
-          </a:p>
-          <a:p>
-            <a:pPr marL="0" indent="0">
-              <a:buNone/>
-            </a:pPr>
-            <a:endParaRPr lang="ko-KR" altLang="en-US" dirty="0"/>
-          </a:p>
-        </p:txBody>
-      </p:sp>
-    </p:spTree>
-    <p:extLst>
-      <p:ext uri="{BB962C8B-B14F-4D97-AF65-F5344CB8AC3E}">
-        <p14:creationId xmlns:p14="http://schemas.microsoft.com/office/powerpoint/2010/main" val="1252952109"/>
-      </p:ext>
-    </p:extLst>
-  </p:cSld>
-  <p:clrMapOvr>
-    <a:masterClrMapping/>
-  </p:clrMapOvr>
   <p:timing>
     <p:tnLst>
       <p:par>
@@ -7639,7 +7785,7 @@
 </p:sld>
 </file>
 
-<file path=ppt/slides/slide30.xml><?xml version="1.0" encoding="utf-8"?>
+<file path=ppt/slides/slide31.xml><?xml version="1.0" encoding="utf-8"?>
 <p:sld xmlns:a="http://schemas.openxmlformats.org/drawingml/2006/main" xmlns:r="http://schemas.openxmlformats.org/officeDocument/2006/relationships" xmlns:p="http://schemas.openxmlformats.org/presentationml/2006/main">
   <p:cSld>
     <p:spTree>
@@ -7752,7 +7898,7 @@
 </p:sld>
 </file>
 
-<file path=ppt/slides/slide31.xml><?xml version="1.0" encoding="utf-8"?>
+<file path=ppt/slides/slide32.xml><?xml version="1.0" encoding="utf-8"?>
 <p:sld xmlns:a="http://schemas.openxmlformats.org/drawingml/2006/main" xmlns:r="http://schemas.openxmlformats.org/officeDocument/2006/relationships" xmlns:p="http://schemas.openxmlformats.org/presentationml/2006/main">
   <p:cSld>
     <p:spTree>

</xml_diff>

<commit_message>
ASM-28 The_Quest  김정수 Ver. 0.9.1
</commit_message>
<xml_diff>
--- a/kim/Quest/The Quest.pptx
+++ b/kim/Quest/The Quest.pptx
@@ -33,10 +33,7 @@
     <p:sldId id="282" r:id="rId27"/>
     <p:sldId id="283" r:id="rId28"/>
     <p:sldId id="288" r:id="rId29"/>
-    <p:sldId id="285" r:id="rId30"/>
-    <p:sldId id="286" r:id="rId31"/>
-    <p:sldId id="287" r:id="rId32"/>
-    <p:sldId id="284" r:id="rId33"/>
+    <p:sldId id="284" r:id="rId30"/>
   </p:sldIdLst>
   <p:sldSz cx="9144000" cy="6858000" type="screen4x3"/>
   <p:notesSz cx="6858000" cy="9144000"/>
@@ -345,7 +342,7 @@
           <a:p>
             <a:fld id="{4C13B907-2B22-40F9-8D59-02F7D424F478}" type="datetimeFigureOut">
               <a:rPr lang="ko-KR" altLang="en-US" smtClean="0"/>
-              <a:t>2018-03-19</a:t>
+              <a:t>2018-03-20</a:t>
             </a:fld>
             <a:endParaRPr lang="ko-KR" altLang="en-US"/>
           </a:p>
@@ -539,7 +536,7 @@
           <a:p>
             <a:fld id="{4C13B907-2B22-40F9-8D59-02F7D424F478}" type="datetimeFigureOut">
               <a:rPr lang="ko-KR" altLang="en-US" smtClean="0"/>
-              <a:t>2018-03-19</a:t>
+              <a:t>2018-03-20</a:t>
             </a:fld>
             <a:endParaRPr lang="ko-KR" altLang="en-US"/>
           </a:p>
@@ -727,7 +724,7 @@
           <a:p>
             <a:fld id="{4C13B907-2B22-40F9-8D59-02F7D424F478}" type="datetimeFigureOut">
               <a:rPr lang="ko-KR" altLang="en-US" smtClean="0"/>
-              <a:t>2018-03-19</a:t>
+              <a:t>2018-03-20</a:t>
             </a:fld>
             <a:endParaRPr lang="ko-KR" altLang="en-US"/>
           </a:p>
@@ -956,7 +953,7 @@
           <a:p>
             <a:fld id="{4C13B907-2B22-40F9-8D59-02F7D424F478}" type="datetimeFigureOut">
               <a:rPr lang="ko-KR" altLang="en-US" smtClean="0"/>
-              <a:t>2018-03-19</a:t>
+              <a:t>2018-03-20</a:t>
             </a:fld>
             <a:endParaRPr lang="ko-KR" altLang="en-US"/>
           </a:p>
@@ -1237,7 +1234,7 @@
           <a:p>
             <a:fld id="{4C13B907-2B22-40F9-8D59-02F7D424F478}" type="datetimeFigureOut">
               <a:rPr lang="ko-KR" altLang="en-US" smtClean="0"/>
-              <a:t>2018-03-19</a:t>
+              <a:t>2018-03-20</a:t>
             </a:fld>
             <a:endParaRPr lang="ko-KR" altLang="en-US"/>
           </a:p>
@@ -1525,7 +1522,7 @@
           <a:p>
             <a:fld id="{4C13B907-2B22-40F9-8D59-02F7D424F478}" type="datetimeFigureOut">
               <a:rPr lang="ko-KR" altLang="en-US" smtClean="0"/>
-              <a:t>2018-03-19</a:t>
+              <a:t>2018-03-20</a:t>
             </a:fld>
             <a:endParaRPr lang="ko-KR" altLang="en-US"/>
           </a:p>
@@ -2079,7 +2076,7 @@
           <a:p>
             <a:fld id="{4C13B907-2B22-40F9-8D59-02F7D424F478}" type="datetimeFigureOut">
               <a:rPr lang="ko-KR" altLang="en-US" smtClean="0"/>
-              <a:t>2018-03-19</a:t>
+              <a:t>2018-03-20</a:t>
             </a:fld>
             <a:endParaRPr lang="ko-KR" altLang="en-US"/>
           </a:p>
@@ -2210,7 +2207,7 @@
           <a:p>
             <a:fld id="{4C13B907-2B22-40F9-8D59-02F7D424F478}" type="datetimeFigureOut">
               <a:rPr lang="ko-KR" altLang="en-US" smtClean="0"/>
-              <a:t>2018-03-19</a:t>
+              <a:t>2018-03-20</a:t>
             </a:fld>
             <a:endParaRPr lang="ko-KR" altLang="en-US"/>
           </a:p>
@@ -2360,7 +2357,7 @@
           <a:p>
             <a:fld id="{4C13B907-2B22-40F9-8D59-02F7D424F478}" type="datetimeFigureOut">
               <a:rPr lang="ko-KR" altLang="en-US" smtClean="0"/>
-              <a:t>2018-03-19</a:t>
+              <a:t>2018-03-20</a:t>
             </a:fld>
             <a:endParaRPr lang="ko-KR" altLang="en-US"/>
           </a:p>
@@ -2681,7 +2678,7 @@
           <a:p>
             <a:fld id="{4C13B907-2B22-40F9-8D59-02F7D424F478}" type="datetimeFigureOut">
               <a:rPr lang="ko-KR" altLang="en-US" smtClean="0"/>
-              <a:t>2018-03-19</a:t>
+              <a:t>2018-03-20</a:t>
             </a:fld>
             <a:endParaRPr lang="ko-KR" altLang="en-US"/>
           </a:p>
@@ -2978,7 +2975,7 @@
           <a:p>
             <a:fld id="{4C13B907-2B22-40F9-8D59-02F7D424F478}" type="datetimeFigureOut">
               <a:rPr lang="ko-KR" altLang="en-US" smtClean="0"/>
-              <a:t>2018-03-19</a:t>
+              <a:t>2018-03-20</a:t>
             </a:fld>
             <a:endParaRPr lang="ko-KR" altLang="en-US"/>
           </a:p>
@@ -3223,7 +3220,7 @@
           <a:p>
             <a:fld id="{4C13B907-2B22-40F9-8D59-02F7D424F478}" type="datetimeFigureOut">
               <a:rPr lang="ko-KR" altLang="en-US" smtClean="0"/>
-              <a:t>2018-03-19</a:t>
+              <a:t>2018-03-20</a:t>
             </a:fld>
             <a:endParaRPr lang="ko-KR" altLang="en-US"/>
           </a:p>
@@ -7435,7 +7432,7 @@
           <a:p>
             <a:r>
               <a:rPr lang="ko-KR" altLang="en-US" dirty="0" smtClean="0"/>
-              <a:t>실행 화면</a:t>
+              <a:t>마치며</a:t>
             </a:r>
             <a:endParaRPr lang="ko-KR" altLang="en-US" dirty="0"/>
           </a:p>
@@ -7456,68 +7453,155 @@
           <a:bodyPr/>
           <a:lstStyle/>
           <a:p>
+            <a:r>
+              <a:rPr lang="ko-KR" altLang="en-US" dirty="0" smtClean="0"/>
+              <a:t>의도치 않은 간단한 버그</a:t>
+            </a:r>
+            <a:r>
+              <a:rPr lang="en-US" altLang="ko-KR" dirty="0" smtClean="0"/>
+              <a:t>( </a:t>
+            </a:r>
+            <a:r>
+              <a:rPr lang="ko-KR" altLang="en-US" dirty="0" err="1" smtClean="0"/>
+              <a:t>몬스터와</a:t>
+            </a:r>
+            <a:r>
+              <a:rPr lang="ko-KR" altLang="en-US" dirty="0" smtClean="0"/>
+              <a:t> 캐릭터가 겹치면 </a:t>
+            </a:r>
+            <a:r>
+              <a:rPr lang="ko-KR" altLang="en-US" dirty="0" err="1" smtClean="0"/>
+              <a:t>공격어느</a:t>
+            </a:r>
+            <a:r>
+              <a:rPr lang="ko-KR" altLang="en-US" dirty="0" smtClean="0"/>
+              <a:t> 방향을 공격하던 </a:t>
+            </a:r>
+            <a:r>
+              <a:rPr lang="ko-KR" altLang="en-US" dirty="0" err="1" smtClean="0"/>
+              <a:t>데미지가</a:t>
+            </a:r>
+            <a:r>
+              <a:rPr lang="ko-KR" altLang="en-US" dirty="0" smtClean="0"/>
+              <a:t> </a:t>
+            </a:r>
+            <a:r>
+              <a:rPr lang="ko-KR" altLang="en-US" dirty="0" err="1" smtClean="0"/>
+              <a:t>안들어간다</a:t>
+            </a:r>
+            <a:r>
+              <a:rPr lang="en-US" altLang="ko-KR" dirty="0" smtClean="0"/>
+              <a:t>)</a:t>
+            </a:r>
+            <a:r>
+              <a:rPr lang="ko-KR" altLang="en-US" dirty="0" smtClean="0"/>
+              <a:t>의 존재 </a:t>
+            </a:r>
+            <a:endParaRPr lang="en-US" altLang="ko-KR" dirty="0" smtClean="0"/>
+          </a:p>
+          <a:p>
+            <a:pPr lvl="1"/>
+            <a:r>
+              <a:rPr lang="ko-KR" altLang="en-US" dirty="0" err="1" smtClean="0"/>
+              <a:t>조금더</a:t>
+            </a:r>
+            <a:r>
+              <a:rPr lang="ko-KR" altLang="en-US" dirty="0"/>
+              <a:t> </a:t>
+            </a:r>
+            <a:r>
+              <a:rPr lang="ko-KR" altLang="en-US" dirty="0" smtClean="0"/>
+              <a:t>시간이 있었다면</a:t>
+            </a:r>
+            <a:r>
+              <a:rPr lang="en-US" altLang="ko-KR" dirty="0" smtClean="0"/>
+              <a:t>?</a:t>
+            </a:r>
+          </a:p>
+          <a:p>
+            <a:pPr lvl="1"/>
+            <a:endParaRPr lang="en-US" altLang="ko-KR" dirty="0"/>
+          </a:p>
+          <a:p>
+            <a:r>
+              <a:rPr lang="ko-KR" altLang="en-US" dirty="0" err="1" smtClean="0"/>
+              <a:t>몬스터가</a:t>
+            </a:r>
+            <a:r>
+              <a:rPr lang="ko-KR" altLang="en-US" dirty="0" smtClean="0"/>
+              <a:t> 너무 쌔다 </a:t>
+            </a:r>
+            <a:endParaRPr lang="en-US" altLang="ko-KR" dirty="0" smtClean="0"/>
+          </a:p>
+          <a:p>
+            <a:pPr lvl="1"/>
+            <a:r>
+              <a:rPr lang="ko-KR" altLang="en-US" dirty="0" smtClean="0"/>
+              <a:t>모든 </a:t>
+            </a:r>
+            <a:r>
+              <a:rPr lang="ko-KR" altLang="en-US" dirty="0" err="1" smtClean="0"/>
+              <a:t>데미지가</a:t>
+            </a:r>
+            <a:r>
+              <a:rPr lang="ko-KR" altLang="en-US" dirty="0" smtClean="0"/>
+              <a:t> </a:t>
+            </a:r>
+            <a:r>
+              <a:rPr lang="en-US" altLang="ko-KR" dirty="0" smtClean="0"/>
+              <a:t>random</a:t>
+            </a:r>
+            <a:r>
+              <a:rPr lang="ko-KR" altLang="en-US" dirty="0" err="1" smtClean="0"/>
+              <a:t>일텐데</a:t>
+            </a:r>
+            <a:r>
+              <a:rPr lang="en-US" altLang="ko-KR" dirty="0" smtClean="0"/>
+              <a:t>…</a:t>
+            </a:r>
+          </a:p>
+          <a:p>
+            <a:r>
+              <a:rPr lang="ko-KR" altLang="en-US" dirty="0" err="1" smtClean="0"/>
+              <a:t>몬스터가</a:t>
+            </a:r>
+            <a:r>
+              <a:rPr lang="ko-KR" altLang="en-US" dirty="0" smtClean="0"/>
+              <a:t> 죽었을 때의 코드가 없다</a:t>
+            </a:r>
+            <a:r>
+              <a:rPr lang="en-US" altLang="ko-KR" dirty="0" smtClean="0"/>
+              <a:t>.</a:t>
+            </a:r>
+          </a:p>
+          <a:p>
+            <a:pPr lvl="1"/>
+            <a:r>
+              <a:rPr lang="ko-KR" altLang="en-US" dirty="0" smtClean="0"/>
+              <a:t>죽어도 이미지만 </a:t>
+            </a:r>
+            <a:r>
+              <a:rPr lang="ko-KR" altLang="en-US" dirty="0" err="1" smtClean="0"/>
+              <a:t>사라질뿐</a:t>
+            </a:r>
+            <a:r>
+              <a:rPr lang="ko-KR" altLang="en-US" dirty="0" smtClean="0"/>
+              <a:t> 객체는 남아있다</a:t>
+            </a:r>
             <a:endParaRPr lang="ko-KR" altLang="en-US" dirty="0"/>
           </a:p>
         </p:txBody>
       </p:sp>
-      <p:pic>
-        <p:nvPicPr>
-          <p:cNvPr id="14339" name="Picture 3" descr="C:\Users\김정수\Desktop\제목 없음.png"/>
-          <p:cNvPicPr>
-            <a:picLocks noChangeAspect="1" noChangeArrowheads="1"/>
-          </p:cNvPicPr>
-          <p:nvPr/>
-        </p:nvPicPr>
-        <p:blipFill>
-          <a:blip r:embed="rId2">
-            <a:extLst>
-              <a:ext uri="{28A0092B-C50C-407E-A947-70E740481C1C}">
-                <a14:useLocalDpi xmlns:a14="http://schemas.microsoft.com/office/drawing/2010/main" val="0"/>
-              </a:ext>
-            </a:extLst>
-          </a:blip>
-          <a:srcRect/>
-          <a:stretch>
-            <a:fillRect/>
-          </a:stretch>
-        </p:blipFill>
-        <p:spPr bwMode="auto">
-          <a:xfrm>
-            <a:off x="467544" y="1700808"/>
-            <a:ext cx="7945438" cy="4095750"/>
-          </a:xfrm>
-          <a:prstGeom prst="rect">
-            <a:avLst/>
-          </a:prstGeom>
-          <a:noFill/>
-          <a:extLst>
-            <a:ext uri="{909E8E84-426E-40DD-AFC4-6F175D3DCCD1}">
-              <a14:hiddenFill xmlns:a14="http://schemas.microsoft.com/office/drawing/2010/main">
-                <a:solidFill>
-                  <a:srgbClr val="FFFFFF"/>
-                </a:solidFill>
-              </a14:hiddenFill>
-            </a:ext>
-          </a:extLst>
-        </p:spPr>
-      </p:pic>
     </p:spTree>
     <p:extLst>
       <p:ext uri="{BB962C8B-B14F-4D97-AF65-F5344CB8AC3E}">
-        <p14:creationId xmlns:p14="http://schemas.microsoft.com/office/powerpoint/2010/main" val="1420029067"/>
+        <p14:creationId xmlns:p14="http://schemas.microsoft.com/office/powerpoint/2010/main" val="3730155181"/>
       </p:ext>
     </p:extLst>
   </p:cSld>
   <p:clrMapOvr>
     <a:masterClrMapping/>
   </p:clrMapOvr>
-  <p:timing>
-    <p:tnLst>
-      <p:par>
-        <p:cTn id="1" dur="indefinite" restart="never" nodeType="tmRoot"/>
-      </p:par>
-    </p:tnLst>
-  </p:timing>
 </p:sld>
 </file>
 
@@ -7662,417 +7746,6 @@
       </p:par>
     </p:tnLst>
   </p:timing>
-</p:sld>
-</file>
-
-<file path=ppt/slides/slide30.xml><?xml version="1.0" encoding="utf-8"?>
-<p:sld xmlns:a="http://schemas.openxmlformats.org/drawingml/2006/main" xmlns:r="http://schemas.openxmlformats.org/officeDocument/2006/relationships" xmlns:p="http://schemas.openxmlformats.org/presentationml/2006/main">
-  <p:cSld>
-    <p:spTree>
-      <p:nvGrpSpPr>
-        <p:cNvPr id="1" name=""/>
-        <p:cNvGrpSpPr/>
-        <p:nvPr/>
-      </p:nvGrpSpPr>
-      <p:grpSpPr>
-        <a:xfrm>
-          <a:off x="0" y="0"/>
-          <a:ext cx="0" cy="0"/>
-          <a:chOff x="0" y="0"/>
-          <a:chExt cx="0" cy="0"/>
-        </a:xfrm>
-      </p:grpSpPr>
-      <p:sp>
-        <p:nvSpPr>
-          <p:cNvPr id="2" name="제목 1"/>
-          <p:cNvSpPr>
-            <a:spLocks noGrp="1"/>
-          </p:cNvSpPr>
-          <p:nvPr>
-            <p:ph type="title"/>
-          </p:nvPr>
-        </p:nvSpPr>
-        <p:spPr/>
-        <p:txBody>
-          <a:bodyPr/>
-          <a:lstStyle/>
-          <a:p>
-            <a:r>
-              <a:rPr lang="ko-KR" altLang="en-US" dirty="0" smtClean="0"/>
-              <a:t>실행화면</a:t>
-            </a:r>
-            <a:endParaRPr lang="ko-KR" altLang="en-US" dirty="0"/>
-          </a:p>
-        </p:txBody>
-      </p:sp>
-      <p:sp>
-        <p:nvSpPr>
-          <p:cNvPr id="3" name="내용 개체 틀 2"/>
-          <p:cNvSpPr>
-            <a:spLocks noGrp="1"/>
-          </p:cNvSpPr>
-          <p:nvPr>
-            <p:ph idx="1"/>
-          </p:nvPr>
-        </p:nvSpPr>
-        <p:spPr/>
-        <p:txBody>
-          <a:bodyPr/>
-          <a:lstStyle/>
-          <a:p>
-            <a:endParaRPr lang="ko-KR" altLang="en-US"/>
-          </a:p>
-        </p:txBody>
-      </p:sp>
-      <p:pic>
-        <p:nvPicPr>
-          <p:cNvPr id="15362" name="Picture 2" descr="C:\Users\김정수\Desktop\제목 없음.png"/>
-          <p:cNvPicPr>
-            <a:picLocks noChangeAspect="1" noChangeArrowheads="1"/>
-          </p:cNvPicPr>
-          <p:nvPr/>
-        </p:nvPicPr>
-        <p:blipFill>
-          <a:blip r:embed="rId2">
-            <a:extLst>
-              <a:ext uri="{28A0092B-C50C-407E-A947-70E740481C1C}">
-                <a14:useLocalDpi xmlns:a14="http://schemas.microsoft.com/office/drawing/2010/main" val="0"/>
-              </a:ext>
-            </a:extLst>
-          </a:blip>
-          <a:srcRect/>
-          <a:stretch>
-            <a:fillRect/>
-          </a:stretch>
-        </p:blipFill>
-        <p:spPr bwMode="auto">
-          <a:xfrm>
-            <a:off x="467543" y="1628800"/>
-            <a:ext cx="8219655" cy="4320480"/>
-          </a:xfrm>
-          <a:prstGeom prst="rect">
-            <a:avLst/>
-          </a:prstGeom>
-          <a:noFill/>
-          <a:extLst>
-            <a:ext uri="{909E8E84-426E-40DD-AFC4-6F175D3DCCD1}">
-              <a14:hiddenFill xmlns:a14="http://schemas.microsoft.com/office/drawing/2010/main">
-                <a:solidFill>
-                  <a:srgbClr val="FFFFFF"/>
-                </a:solidFill>
-              </a14:hiddenFill>
-            </a:ext>
-          </a:extLst>
-        </p:spPr>
-      </p:pic>
-    </p:spTree>
-    <p:extLst>
-      <p:ext uri="{BB962C8B-B14F-4D97-AF65-F5344CB8AC3E}">
-        <p14:creationId xmlns:p14="http://schemas.microsoft.com/office/powerpoint/2010/main" val="2148269536"/>
-      </p:ext>
-    </p:extLst>
-  </p:cSld>
-  <p:clrMapOvr>
-    <a:masterClrMapping/>
-  </p:clrMapOvr>
-  <p:timing>
-    <p:tnLst>
-      <p:par>
-        <p:cTn id="1" dur="indefinite" restart="never" nodeType="tmRoot"/>
-      </p:par>
-    </p:tnLst>
-  </p:timing>
-</p:sld>
-</file>
-
-<file path=ppt/slides/slide31.xml><?xml version="1.0" encoding="utf-8"?>
-<p:sld xmlns:a="http://schemas.openxmlformats.org/drawingml/2006/main" xmlns:r="http://schemas.openxmlformats.org/officeDocument/2006/relationships" xmlns:p="http://schemas.openxmlformats.org/presentationml/2006/main">
-  <p:cSld>
-    <p:spTree>
-      <p:nvGrpSpPr>
-        <p:cNvPr id="1" name=""/>
-        <p:cNvGrpSpPr/>
-        <p:nvPr/>
-      </p:nvGrpSpPr>
-      <p:grpSpPr>
-        <a:xfrm>
-          <a:off x="0" y="0"/>
-          <a:ext cx="0" cy="0"/>
-          <a:chOff x="0" y="0"/>
-          <a:chExt cx="0" cy="0"/>
-        </a:xfrm>
-      </p:grpSpPr>
-      <p:sp>
-        <p:nvSpPr>
-          <p:cNvPr id="2" name="제목 1"/>
-          <p:cNvSpPr>
-            <a:spLocks noGrp="1"/>
-          </p:cNvSpPr>
-          <p:nvPr>
-            <p:ph type="title"/>
-          </p:nvPr>
-        </p:nvSpPr>
-        <p:spPr/>
-        <p:txBody>
-          <a:bodyPr/>
-          <a:lstStyle/>
-          <a:p>
-            <a:r>
-              <a:rPr lang="ko-KR" altLang="en-US" dirty="0" smtClean="0"/>
-              <a:t>실행화면</a:t>
-            </a:r>
-            <a:endParaRPr lang="ko-KR" altLang="en-US" dirty="0"/>
-          </a:p>
-        </p:txBody>
-      </p:sp>
-      <p:sp>
-        <p:nvSpPr>
-          <p:cNvPr id="3" name="내용 개체 틀 2"/>
-          <p:cNvSpPr>
-            <a:spLocks noGrp="1"/>
-          </p:cNvSpPr>
-          <p:nvPr>
-            <p:ph idx="1"/>
-          </p:nvPr>
-        </p:nvSpPr>
-        <p:spPr/>
-        <p:txBody>
-          <a:bodyPr/>
-          <a:lstStyle/>
-          <a:p>
-            <a:endParaRPr lang="ko-KR" altLang="en-US"/>
-          </a:p>
-        </p:txBody>
-      </p:sp>
-      <p:pic>
-        <p:nvPicPr>
-          <p:cNvPr id="16387" name="Picture 3" descr="C:\Users\김정수\Desktop\제목 없음.png"/>
-          <p:cNvPicPr>
-            <a:picLocks noChangeAspect="1" noChangeArrowheads="1"/>
-          </p:cNvPicPr>
-          <p:nvPr/>
-        </p:nvPicPr>
-        <p:blipFill>
-          <a:blip r:embed="rId2">
-            <a:extLst>
-              <a:ext uri="{28A0092B-C50C-407E-A947-70E740481C1C}">
-                <a14:useLocalDpi xmlns:a14="http://schemas.microsoft.com/office/drawing/2010/main" val="0"/>
-              </a:ext>
-            </a:extLst>
-          </a:blip>
-          <a:srcRect/>
-          <a:stretch>
-            <a:fillRect/>
-          </a:stretch>
-        </p:blipFill>
-        <p:spPr bwMode="auto">
-          <a:xfrm>
-            <a:off x="467544" y="1628800"/>
-            <a:ext cx="8170396" cy="4536504"/>
-          </a:xfrm>
-          <a:prstGeom prst="rect">
-            <a:avLst/>
-          </a:prstGeom>
-          <a:noFill/>
-          <a:extLst>
-            <a:ext uri="{909E8E84-426E-40DD-AFC4-6F175D3DCCD1}">
-              <a14:hiddenFill xmlns:a14="http://schemas.microsoft.com/office/drawing/2010/main">
-                <a:solidFill>
-                  <a:srgbClr val="FFFFFF"/>
-                </a:solidFill>
-              </a14:hiddenFill>
-            </a:ext>
-          </a:extLst>
-        </p:spPr>
-      </p:pic>
-    </p:spTree>
-    <p:extLst>
-      <p:ext uri="{BB962C8B-B14F-4D97-AF65-F5344CB8AC3E}">
-        <p14:creationId xmlns:p14="http://schemas.microsoft.com/office/powerpoint/2010/main" val="2156606731"/>
-      </p:ext>
-    </p:extLst>
-  </p:cSld>
-  <p:clrMapOvr>
-    <a:masterClrMapping/>
-  </p:clrMapOvr>
-</p:sld>
-</file>
-
-<file path=ppt/slides/slide32.xml><?xml version="1.0" encoding="utf-8"?>
-<p:sld xmlns:a="http://schemas.openxmlformats.org/drawingml/2006/main" xmlns:r="http://schemas.openxmlformats.org/officeDocument/2006/relationships" xmlns:p="http://schemas.openxmlformats.org/presentationml/2006/main">
-  <p:cSld>
-    <p:spTree>
-      <p:nvGrpSpPr>
-        <p:cNvPr id="1" name=""/>
-        <p:cNvGrpSpPr/>
-        <p:nvPr/>
-      </p:nvGrpSpPr>
-      <p:grpSpPr>
-        <a:xfrm>
-          <a:off x="0" y="0"/>
-          <a:ext cx="0" cy="0"/>
-          <a:chOff x="0" y="0"/>
-          <a:chExt cx="0" cy="0"/>
-        </a:xfrm>
-      </p:grpSpPr>
-      <p:sp>
-        <p:nvSpPr>
-          <p:cNvPr id="2" name="제목 1"/>
-          <p:cNvSpPr>
-            <a:spLocks noGrp="1"/>
-          </p:cNvSpPr>
-          <p:nvPr>
-            <p:ph type="title"/>
-          </p:nvPr>
-        </p:nvSpPr>
-        <p:spPr/>
-        <p:txBody>
-          <a:bodyPr/>
-          <a:lstStyle/>
-          <a:p>
-            <a:r>
-              <a:rPr lang="ko-KR" altLang="en-US" dirty="0" smtClean="0"/>
-              <a:t>마치며</a:t>
-            </a:r>
-            <a:endParaRPr lang="ko-KR" altLang="en-US" dirty="0"/>
-          </a:p>
-        </p:txBody>
-      </p:sp>
-      <p:sp>
-        <p:nvSpPr>
-          <p:cNvPr id="3" name="내용 개체 틀 2"/>
-          <p:cNvSpPr>
-            <a:spLocks noGrp="1"/>
-          </p:cNvSpPr>
-          <p:nvPr>
-            <p:ph idx="1"/>
-          </p:nvPr>
-        </p:nvSpPr>
-        <p:spPr/>
-        <p:txBody>
-          <a:bodyPr/>
-          <a:lstStyle/>
-          <a:p>
-            <a:r>
-              <a:rPr lang="ko-KR" altLang="en-US" dirty="0" smtClean="0"/>
-              <a:t>의도치 않은 간단한 버그</a:t>
-            </a:r>
-            <a:r>
-              <a:rPr lang="en-US" altLang="ko-KR" dirty="0" smtClean="0"/>
-              <a:t>( </a:t>
-            </a:r>
-            <a:r>
-              <a:rPr lang="ko-KR" altLang="en-US" dirty="0" err="1" smtClean="0"/>
-              <a:t>몬스터와</a:t>
-            </a:r>
-            <a:r>
-              <a:rPr lang="ko-KR" altLang="en-US" dirty="0" smtClean="0"/>
-              <a:t> 캐릭터가 겹치면 </a:t>
-            </a:r>
-            <a:r>
-              <a:rPr lang="ko-KR" altLang="en-US" dirty="0" err="1" smtClean="0"/>
-              <a:t>공격어느</a:t>
-            </a:r>
-            <a:r>
-              <a:rPr lang="ko-KR" altLang="en-US" dirty="0" smtClean="0"/>
-              <a:t> 방향을 공격하던 </a:t>
-            </a:r>
-            <a:r>
-              <a:rPr lang="ko-KR" altLang="en-US" dirty="0" err="1" smtClean="0"/>
-              <a:t>데미지가</a:t>
-            </a:r>
-            <a:r>
-              <a:rPr lang="ko-KR" altLang="en-US" dirty="0" smtClean="0"/>
-              <a:t> </a:t>
-            </a:r>
-            <a:r>
-              <a:rPr lang="ko-KR" altLang="en-US" dirty="0" err="1" smtClean="0"/>
-              <a:t>안들어간다</a:t>
-            </a:r>
-            <a:r>
-              <a:rPr lang="en-US" altLang="ko-KR" dirty="0" smtClean="0"/>
-              <a:t>)</a:t>
-            </a:r>
-            <a:r>
-              <a:rPr lang="ko-KR" altLang="en-US" dirty="0" smtClean="0"/>
-              <a:t>의 존재 </a:t>
-            </a:r>
-            <a:endParaRPr lang="en-US" altLang="ko-KR" dirty="0" smtClean="0"/>
-          </a:p>
-          <a:p>
-            <a:pPr lvl="1"/>
-            <a:r>
-              <a:rPr lang="ko-KR" altLang="en-US" dirty="0" err="1" smtClean="0"/>
-              <a:t>조금더</a:t>
-            </a:r>
-            <a:r>
-              <a:rPr lang="ko-KR" altLang="en-US" dirty="0"/>
-              <a:t> </a:t>
-            </a:r>
-            <a:r>
-              <a:rPr lang="ko-KR" altLang="en-US" dirty="0" smtClean="0"/>
-              <a:t>시간이 있었다면</a:t>
-            </a:r>
-            <a:r>
-              <a:rPr lang="en-US" altLang="ko-KR" dirty="0" smtClean="0"/>
-              <a:t>?</a:t>
-            </a:r>
-          </a:p>
-          <a:p>
-            <a:pPr lvl="1"/>
-            <a:endParaRPr lang="en-US" altLang="ko-KR" dirty="0"/>
-          </a:p>
-          <a:p>
-            <a:r>
-              <a:rPr lang="ko-KR" altLang="en-US" dirty="0" err="1" smtClean="0"/>
-              <a:t>몬스터가</a:t>
-            </a:r>
-            <a:r>
-              <a:rPr lang="ko-KR" altLang="en-US" dirty="0" smtClean="0"/>
-              <a:t> 너무 쌔다 </a:t>
-            </a:r>
-            <a:endParaRPr lang="en-US" altLang="ko-KR" dirty="0" smtClean="0"/>
-          </a:p>
-          <a:p>
-            <a:pPr lvl="1"/>
-            <a:r>
-              <a:rPr lang="ko-KR" altLang="en-US" dirty="0" smtClean="0"/>
-              <a:t>모든 </a:t>
-            </a:r>
-            <a:r>
-              <a:rPr lang="ko-KR" altLang="en-US" dirty="0" err="1" smtClean="0"/>
-              <a:t>데미지가</a:t>
-            </a:r>
-            <a:r>
-              <a:rPr lang="ko-KR" altLang="en-US" dirty="0" smtClean="0"/>
-              <a:t> </a:t>
-            </a:r>
-            <a:r>
-              <a:rPr lang="en-US" altLang="ko-KR" dirty="0" smtClean="0"/>
-              <a:t>random</a:t>
-            </a:r>
-            <a:r>
-              <a:rPr lang="ko-KR" altLang="en-US" dirty="0" err="1" smtClean="0"/>
-              <a:t>일텐데</a:t>
-            </a:r>
-            <a:r>
-              <a:rPr lang="en-US" altLang="ko-KR" dirty="0" smtClean="0"/>
-              <a:t>…</a:t>
-            </a:r>
-            <a:endParaRPr lang="ko-KR" altLang="en-US" dirty="0"/>
-          </a:p>
-        </p:txBody>
-      </p:sp>
-    </p:spTree>
-    <p:extLst>
-      <p:ext uri="{BB962C8B-B14F-4D97-AF65-F5344CB8AC3E}">
-        <p14:creationId xmlns:p14="http://schemas.microsoft.com/office/powerpoint/2010/main" val="3730155181"/>
-      </p:ext>
-    </p:extLst>
-  </p:cSld>
-  <p:clrMapOvr>
-    <a:masterClrMapping/>
-  </p:clrMapOvr>
 </p:sld>
 </file>
 

</xml_diff>